<commit_message>
Final Review W6D2 W6D3
</commit_message>
<xml_diff>
--- a/D1/0. Code on Cloud.pptx
+++ b/D1/0. Code on Cloud.pptx
@@ -18540,7 +18540,29 @@
                   <a:srgbClr val="FFFFFF"/>
                 </a:highlight>
               </a:rPr>
-              <a:t> but in Google Cloud Platform0’s Vertex AI</a:t>
+              <a:t> but in Google </a:t>
+            </a:r>
+            <a:r>
+              <a:rPr lang="en-US" sz="1200">
+                <a:solidFill>
+                  <a:srgbClr val="24292E"/>
+                </a:solidFill>
+                <a:highlight>
+                  <a:srgbClr val="FFFFFF"/>
+                </a:highlight>
+              </a:rPr>
+              <a:t>Cloud Platform’s </a:t>
+            </a:r>
+            <a:r>
+              <a:rPr lang="en-US" sz="1200" dirty="0">
+                <a:solidFill>
+                  <a:srgbClr val="24292E"/>
+                </a:solidFill>
+                <a:highlight>
+                  <a:srgbClr val="FFFFFF"/>
+                </a:highlight>
+              </a:rPr>
+              <a:t>Vertex AI</a:t>
             </a:r>
           </a:p>
           <a:p>

</xml_diff>